<commit_message>
Added the fourth demo
</commit_message>
<xml_diff>
--- a/Presentation/ZeroMQ.pptx
+++ b/Presentation/ZeroMQ.pptx
@@ -4,6 +4,9 @@
   <p:sldMasterIdLst>
     <p:sldMasterId id="2147483672" r:id="rId1"/>
   </p:sldMasterIdLst>
+  <p:notesMasterIdLst>
+    <p:notesMasterId r:id="rId13"/>
+  </p:notesMasterIdLst>
   <p:sldIdLst>
     <p:sldId id="256" r:id="rId2"/>
     <p:sldId id="257" r:id="rId3"/>
@@ -14,7 +17,8 @@
     <p:sldId id="264" r:id="rId8"/>
     <p:sldId id="265" r:id="rId9"/>
     <p:sldId id="266" r:id="rId10"/>
-    <p:sldId id="260" r:id="rId11"/>
+    <p:sldId id="267" r:id="rId11"/>
+    <p:sldId id="260" r:id="rId12"/>
   </p:sldIdLst>
   <p:sldSz cx="9144000" cy="6858000" type="screen4x3"/>
   <p:notesSz cx="6858000" cy="9144000"/>
@@ -886,7 +890,7 @@
         <a:p>
           <a:r>
             <a:rPr lang="en-US" dirty="0" smtClean="0"/>
-            <a:t>Request</a:t>
+            <a:t>REQ</a:t>
           </a:r>
           <a:endParaRPr lang="en-US" dirty="0"/>
         </a:p>
@@ -923,7 +927,7 @@
         <a:p>
           <a:r>
             <a:rPr lang="en-US" dirty="0" smtClean="0"/>
-            <a:t>Reply</a:t>
+            <a:t>REP</a:t>
           </a:r>
           <a:endParaRPr lang="en-US" dirty="0"/>
         </a:p>
@@ -1077,12 +1081,12 @@
         </a:fontRef>
       </dsp:style>
       <dsp:txBody>
-        <a:bodyPr spcFirstLastPara="0" vert="horz" wrap="square" lIns="40640" tIns="40640" rIns="40640" bIns="40640" numCol="1" spcCol="1270" anchor="ctr" anchorCtr="0">
+        <a:bodyPr spcFirstLastPara="0" vert="horz" wrap="square" lIns="68580" tIns="68580" rIns="68580" bIns="68580" numCol="1" spcCol="1270" anchor="ctr" anchorCtr="0">
           <a:noAutofit/>
         </a:bodyPr>
         <a:lstStyle/>
         <a:p>
-          <a:pPr lvl="0" algn="ctr" defTabSz="1422400">
+          <a:pPr lvl="0" algn="ctr" defTabSz="2400300">
             <a:lnSpc>
               <a:spcPct val="90000"/>
             </a:lnSpc>
@@ -1094,10 +1098,10 @@
             </a:spcAft>
           </a:pPr>
           <a:r>
-            <a:rPr lang="en-US" sz="3200" kern="1200" dirty="0" smtClean="0"/>
-            <a:t>Request</a:t>
+            <a:rPr lang="en-US" sz="5400" kern="1200" dirty="0" smtClean="0"/>
+            <a:t>REQ</a:t>
           </a:r>
-          <a:endParaRPr lang="en-US" sz="3200" kern="1200" dirty="0"/>
+          <a:endParaRPr lang="en-US" sz="5400" kern="1200" dirty="0"/>
         </a:p>
       </dsp:txBody>
       <dsp:txXfrm>
@@ -1155,7 +1159,7 @@
         </a:bodyPr>
         <a:lstStyle/>
         <a:p>
-          <a:pPr lvl="0" algn="ctr" defTabSz="1155700">
+          <a:pPr lvl="0" algn="ctr" defTabSz="1555750">
             <a:lnSpc>
               <a:spcPct val="90000"/>
             </a:lnSpc>
@@ -1166,7 +1170,7 @@
               <a:spcPct val="35000"/>
             </a:spcAft>
           </a:pPr>
-          <a:endParaRPr lang="en-US" sz="2600" kern="1200"/>
+          <a:endParaRPr lang="en-US" sz="3500" kern="1200"/>
         </a:p>
       </dsp:txBody>
       <dsp:txXfrm>
@@ -1223,12 +1227,12 @@
         </a:fontRef>
       </dsp:style>
       <dsp:txBody>
-        <a:bodyPr spcFirstLastPara="0" vert="horz" wrap="square" lIns="40640" tIns="40640" rIns="40640" bIns="40640" numCol="1" spcCol="1270" anchor="ctr" anchorCtr="0">
+        <a:bodyPr spcFirstLastPara="0" vert="horz" wrap="square" lIns="68580" tIns="68580" rIns="68580" bIns="68580" numCol="1" spcCol="1270" anchor="ctr" anchorCtr="0">
           <a:noAutofit/>
         </a:bodyPr>
         <a:lstStyle/>
         <a:p>
-          <a:pPr lvl="0" algn="ctr" defTabSz="1422400">
+          <a:pPr lvl="0" algn="ctr" defTabSz="2400300">
             <a:lnSpc>
               <a:spcPct val="90000"/>
             </a:lnSpc>
@@ -1240,10 +1244,10 @@
             </a:spcAft>
           </a:pPr>
           <a:r>
-            <a:rPr lang="en-US" sz="3200" kern="1200" dirty="0" smtClean="0"/>
-            <a:t>Reply</a:t>
+            <a:rPr lang="en-US" sz="5400" kern="1200" dirty="0" smtClean="0"/>
+            <a:t>REP</a:t>
           </a:r>
-          <a:endParaRPr lang="en-US" sz="3200" kern="1200" dirty="0"/>
+          <a:endParaRPr lang="en-US" sz="5400" kern="1200" dirty="0"/>
         </a:p>
       </dsp:txBody>
       <dsp:txXfrm>
@@ -1301,7 +1305,7 @@
         </a:bodyPr>
         <a:lstStyle/>
         <a:p>
-          <a:pPr lvl="0" algn="ctr" defTabSz="1155700">
+          <a:pPr lvl="0" algn="ctr" defTabSz="1555750">
             <a:lnSpc>
               <a:spcPct val="90000"/>
             </a:lnSpc>
@@ -1312,7 +1316,7 @@
               <a:spcPct val="35000"/>
             </a:spcAft>
           </a:pPr>
-          <a:endParaRPr lang="en-US" sz="2600" kern="1200"/>
+          <a:endParaRPr lang="en-US" sz="3500" kern="1200"/>
         </a:p>
       </dsp:txBody>
       <dsp:txXfrm rot="10800000">
@@ -2567,6 +2571,450 @@
     </dgm:style>
   </dgm:styleLbl>
 </dgm:styleDef>
+</file>
+
+<file path=ppt/notesMasters/notesMaster1.xml><?xml version="1.0" encoding="utf-8"?>
+<p:notesMaster xmlns:a="http://schemas.openxmlformats.org/drawingml/2006/main" xmlns:r="http://schemas.openxmlformats.org/officeDocument/2006/relationships" xmlns:p="http://schemas.openxmlformats.org/presentationml/2006/main">
+  <p:cSld>
+    <p:bg>
+      <p:bgRef idx="1001">
+        <a:schemeClr val="bg1"/>
+      </p:bgRef>
+    </p:bg>
+    <p:spTree>
+      <p:nvGrpSpPr>
+        <p:cNvPr id="1" name=""/>
+        <p:cNvGrpSpPr/>
+        <p:nvPr/>
+      </p:nvGrpSpPr>
+      <p:grpSpPr>
+        <a:xfrm>
+          <a:off x="0" y="0"/>
+          <a:ext cx="0" cy="0"/>
+          <a:chOff x="0" y="0"/>
+          <a:chExt cx="0" cy="0"/>
+        </a:xfrm>
+      </p:grpSpPr>
+      <p:sp>
+        <p:nvSpPr>
+          <p:cNvPr id="2" name="Header Placeholder 1"/>
+          <p:cNvSpPr>
+            <a:spLocks noGrp="1"/>
+          </p:cNvSpPr>
+          <p:nvPr>
+            <p:ph type="hdr" sz="quarter"/>
+          </p:nvPr>
+        </p:nvSpPr>
+        <p:spPr>
+          <a:xfrm>
+            <a:off x="0" y="0"/>
+            <a:ext cx="2971800" cy="457200"/>
+          </a:xfrm>
+          <a:prstGeom prst="rect">
+            <a:avLst/>
+          </a:prstGeom>
+        </p:spPr>
+        <p:txBody>
+          <a:bodyPr vert="horz" lIns="91440" tIns="45720" rIns="91440" bIns="45720" rtlCol="0"/>
+          <a:lstStyle>
+            <a:lvl1pPr algn="l">
+              <a:defRPr sz="1200"/>
+            </a:lvl1pPr>
+          </a:lstStyle>
+          <a:p>
+            <a:endParaRPr lang="en-US"/>
+          </a:p>
+        </p:txBody>
+      </p:sp>
+      <p:sp>
+        <p:nvSpPr>
+          <p:cNvPr id="3" name="Date Placeholder 2"/>
+          <p:cNvSpPr>
+            <a:spLocks noGrp="1"/>
+          </p:cNvSpPr>
+          <p:nvPr>
+            <p:ph type="dt" idx="1"/>
+          </p:nvPr>
+        </p:nvSpPr>
+        <p:spPr>
+          <a:xfrm>
+            <a:off x="3884613" y="0"/>
+            <a:ext cx="2971800" cy="457200"/>
+          </a:xfrm>
+          <a:prstGeom prst="rect">
+            <a:avLst/>
+          </a:prstGeom>
+        </p:spPr>
+        <p:txBody>
+          <a:bodyPr vert="horz" lIns="91440" tIns="45720" rIns="91440" bIns="45720" rtlCol="0"/>
+          <a:lstStyle>
+            <a:lvl1pPr algn="r">
+              <a:defRPr sz="1200"/>
+            </a:lvl1pPr>
+          </a:lstStyle>
+          <a:p>
+            <a:fld id="{3C9435E8-BBA3-4168-B039-245A67D50B64}" type="datetimeFigureOut">
+              <a:rPr lang="en-US" smtClean="0"/>
+              <a:t>3/20/2014</a:t>
+            </a:fld>
+            <a:endParaRPr lang="en-US"/>
+          </a:p>
+        </p:txBody>
+      </p:sp>
+      <p:sp>
+        <p:nvSpPr>
+          <p:cNvPr id="4" name="Slide Image Placeholder 3"/>
+          <p:cNvSpPr>
+            <a:spLocks noGrp="1" noRot="1" noChangeAspect="1"/>
+          </p:cNvSpPr>
+          <p:nvPr>
+            <p:ph type="sldImg" idx="2"/>
+          </p:nvPr>
+        </p:nvSpPr>
+        <p:spPr>
+          <a:xfrm>
+            <a:off x="1143000" y="685800"/>
+            <a:ext cx="4572000" cy="3429000"/>
+          </a:xfrm>
+          <a:prstGeom prst="rect">
+            <a:avLst/>
+          </a:prstGeom>
+          <a:noFill/>
+          <a:ln w="12700">
+            <a:solidFill>
+              <a:prstClr val="black"/>
+            </a:solidFill>
+          </a:ln>
+        </p:spPr>
+        <p:txBody>
+          <a:bodyPr vert="horz" lIns="91440" tIns="45720" rIns="91440" bIns="45720" rtlCol="0" anchor="ctr"/>
+          <a:lstStyle/>
+          <a:p>
+            <a:endParaRPr lang="en-US"/>
+          </a:p>
+        </p:txBody>
+      </p:sp>
+      <p:sp>
+        <p:nvSpPr>
+          <p:cNvPr id="5" name="Notes Placeholder 4"/>
+          <p:cNvSpPr>
+            <a:spLocks noGrp="1"/>
+          </p:cNvSpPr>
+          <p:nvPr>
+            <p:ph type="body" sz="quarter" idx="3"/>
+          </p:nvPr>
+        </p:nvSpPr>
+        <p:spPr>
+          <a:xfrm>
+            <a:off x="685800" y="4343400"/>
+            <a:ext cx="5486400" cy="4114800"/>
+          </a:xfrm>
+          <a:prstGeom prst="rect">
+            <a:avLst/>
+          </a:prstGeom>
+        </p:spPr>
+        <p:txBody>
+          <a:bodyPr vert="horz" lIns="91440" tIns="45720" rIns="91440" bIns="45720" rtlCol="0"/>
+          <a:lstStyle/>
+          <a:p>
+            <a:pPr lvl="0"/>
+            <a:r>
+              <a:rPr lang="en-US" smtClean="0"/>
+              <a:t>Click to edit Master text styles</a:t>
+            </a:r>
+          </a:p>
+          <a:p>
+            <a:pPr lvl="1"/>
+            <a:r>
+              <a:rPr lang="en-US" smtClean="0"/>
+              <a:t>Second level</a:t>
+            </a:r>
+          </a:p>
+          <a:p>
+            <a:pPr lvl="2"/>
+            <a:r>
+              <a:rPr lang="en-US" smtClean="0"/>
+              <a:t>Third level</a:t>
+            </a:r>
+          </a:p>
+          <a:p>
+            <a:pPr lvl="3"/>
+            <a:r>
+              <a:rPr lang="en-US" smtClean="0"/>
+              <a:t>Fourth level</a:t>
+            </a:r>
+          </a:p>
+          <a:p>
+            <a:pPr lvl="4"/>
+            <a:r>
+              <a:rPr lang="en-US" smtClean="0"/>
+              <a:t>Fifth level</a:t>
+            </a:r>
+            <a:endParaRPr lang="en-US"/>
+          </a:p>
+        </p:txBody>
+      </p:sp>
+      <p:sp>
+        <p:nvSpPr>
+          <p:cNvPr id="6" name="Footer Placeholder 5"/>
+          <p:cNvSpPr>
+            <a:spLocks noGrp="1"/>
+          </p:cNvSpPr>
+          <p:nvPr>
+            <p:ph type="ftr" sz="quarter" idx="4"/>
+          </p:nvPr>
+        </p:nvSpPr>
+        <p:spPr>
+          <a:xfrm>
+            <a:off x="0" y="8685213"/>
+            <a:ext cx="2971800" cy="457200"/>
+          </a:xfrm>
+          <a:prstGeom prst="rect">
+            <a:avLst/>
+          </a:prstGeom>
+        </p:spPr>
+        <p:txBody>
+          <a:bodyPr vert="horz" lIns="91440" tIns="45720" rIns="91440" bIns="45720" rtlCol="0" anchor="b"/>
+          <a:lstStyle>
+            <a:lvl1pPr algn="l">
+              <a:defRPr sz="1200"/>
+            </a:lvl1pPr>
+          </a:lstStyle>
+          <a:p>
+            <a:endParaRPr lang="en-US"/>
+          </a:p>
+        </p:txBody>
+      </p:sp>
+      <p:sp>
+        <p:nvSpPr>
+          <p:cNvPr id="7" name="Slide Number Placeholder 6"/>
+          <p:cNvSpPr>
+            <a:spLocks noGrp="1"/>
+          </p:cNvSpPr>
+          <p:nvPr>
+            <p:ph type="sldNum" sz="quarter" idx="5"/>
+          </p:nvPr>
+        </p:nvSpPr>
+        <p:spPr>
+          <a:xfrm>
+            <a:off x="3884613" y="8685213"/>
+            <a:ext cx="2971800" cy="457200"/>
+          </a:xfrm>
+          <a:prstGeom prst="rect">
+            <a:avLst/>
+          </a:prstGeom>
+        </p:spPr>
+        <p:txBody>
+          <a:bodyPr vert="horz" lIns="91440" tIns="45720" rIns="91440" bIns="45720" rtlCol="0" anchor="b"/>
+          <a:lstStyle>
+            <a:lvl1pPr algn="r">
+              <a:defRPr sz="1200"/>
+            </a:lvl1pPr>
+          </a:lstStyle>
+          <a:p>
+            <a:fld id="{1B2508BA-5CC2-4344-A11F-861340D98E55}" type="slidenum">
+              <a:rPr lang="en-US" smtClean="0"/>
+              <a:t>‹#›</a:t>
+            </a:fld>
+            <a:endParaRPr lang="en-US"/>
+          </a:p>
+        </p:txBody>
+      </p:sp>
+    </p:spTree>
+    <p:extLst>
+      <p:ext uri="{BB962C8B-B14F-4D97-AF65-F5344CB8AC3E}">
+        <p14:creationId xmlns:p14="http://schemas.microsoft.com/office/powerpoint/2010/main" val="578632948"/>
+      </p:ext>
+    </p:extLst>
+  </p:cSld>
+  <p:clrMap bg1="lt1" tx1="dk1" bg2="lt2" tx2="dk2" accent1="accent1" accent2="accent2" accent3="accent3" accent4="accent4" accent5="accent5" accent6="accent6" hlink="hlink" folHlink="folHlink"/>
+  <p:notesStyle>
+    <a:lvl1pPr marL="0" algn="l" defTabSz="914400" rtl="0" eaLnBrk="1" latinLnBrk="0" hangingPunct="1">
+      <a:defRPr sz="1200" kern="1200">
+        <a:solidFill>
+          <a:schemeClr val="tx1"/>
+        </a:solidFill>
+        <a:latin typeface="+mn-lt"/>
+        <a:ea typeface="+mn-ea"/>
+        <a:cs typeface="+mn-cs"/>
+      </a:defRPr>
+    </a:lvl1pPr>
+    <a:lvl2pPr marL="457200" algn="l" defTabSz="914400" rtl="0" eaLnBrk="1" latinLnBrk="0" hangingPunct="1">
+      <a:defRPr sz="1200" kern="1200">
+        <a:solidFill>
+          <a:schemeClr val="tx1"/>
+        </a:solidFill>
+        <a:latin typeface="+mn-lt"/>
+        <a:ea typeface="+mn-ea"/>
+        <a:cs typeface="+mn-cs"/>
+      </a:defRPr>
+    </a:lvl2pPr>
+    <a:lvl3pPr marL="914400" algn="l" defTabSz="914400" rtl="0" eaLnBrk="1" latinLnBrk="0" hangingPunct="1">
+      <a:defRPr sz="1200" kern="1200">
+        <a:solidFill>
+          <a:schemeClr val="tx1"/>
+        </a:solidFill>
+        <a:latin typeface="+mn-lt"/>
+        <a:ea typeface="+mn-ea"/>
+        <a:cs typeface="+mn-cs"/>
+      </a:defRPr>
+    </a:lvl3pPr>
+    <a:lvl4pPr marL="1371600" algn="l" defTabSz="914400" rtl="0" eaLnBrk="1" latinLnBrk="0" hangingPunct="1">
+      <a:defRPr sz="1200" kern="1200">
+        <a:solidFill>
+          <a:schemeClr val="tx1"/>
+        </a:solidFill>
+        <a:latin typeface="+mn-lt"/>
+        <a:ea typeface="+mn-ea"/>
+        <a:cs typeface="+mn-cs"/>
+      </a:defRPr>
+    </a:lvl4pPr>
+    <a:lvl5pPr marL="1828800" algn="l" defTabSz="914400" rtl="0" eaLnBrk="1" latinLnBrk="0" hangingPunct="1">
+      <a:defRPr sz="1200" kern="1200">
+        <a:solidFill>
+          <a:schemeClr val="tx1"/>
+        </a:solidFill>
+        <a:latin typeface="+mn-lt"/>
+        <a:ea typeface="+mn-ea"/>
+        <a:cs typeface="+mn-cs"/>
+      </a:defRPr>
+    </a:lvl5pPr>
+    <a:lvl6pPr marL="2286000" algn="l" defTabSz="914400" rtl="0" eaLnBrk="1" latinLnBrk="0" hangingPunct="1">
+      <a:defRPr sz="1200" kern="1200">
+        <a:solidFill>
+          <a:schemeClr val="tx1"/>
+        </a:solidFill>
+        <a:latin typeface="+mn-lt"/>
+        <a:ea typeface="+mn-ea"/>
+        <a:cs typeface="+mn-cs"/>
+      </a:defRPr>
+    </a:lvl6pPr>
+    <a:lvl7pPr marL="2743200" algn="l" defTabSz="914400" rtl="0" eaLnBrk="1" latinLnBrk="0" hangingPunct="1">
+      <a:defRPr sz="1200" kern="1200">
+        <a:solidFill>
+          <a:schemeClr val="tx1"/>
+        </a:solidFill>
+        <a:latin typeface="+mn-lt"/>
+        <a:ea typeface="+mn-ea"/>
+        <a:cs typeface="+mn-cs"/>
+      </a:defRPr>
+    </a:lvl7pPr>
+    <a:lvl8pPr marL="3200400" algn="l" defTabSz="914400" rtl="0" eaLnBrk="1" latinLnBrk="0" hangingPunct="1">
+      <a:defRPr sz="1200" kern="1200">
+        <a:solidFill>
+          <a:schemeClr val="tx1"/>
+        </a:solidFill>
+        <a:latin typeface="+mn-lt"/>
+        <a:ea typeface="+mn-ea"/>
+        <a:cs typeface="+mn-cs"/>
+      </a:defRPr>
+    </a:lvl8pPr>
+    <a:lvl9pPr marL="3657600" algn="l" defTabSz="914400" rtl="0" eaLnBrk="1" latinLnBrk="0" hangingPunct="1">
+      <a:defRPr sz="1200" kern="1200">
+        <a:solidFill>
+          <a:schemeClr val="tx1"/>
+        </a:solidFill>
+        <a:latin typeface="+mn-lt"/>
+        <a:ea typeface="+mn-ea"/>
+        <a:cs typeface="+mn-cs"/>
+      </a:defRPr>
+    </a:lvl9pPr>
+  </p:notesStyle>
+</p:notesMaster>
+</file>
+
+<file path=ppt/notesSlides/notesSlide1.xml><?xml version="1.0" encoding="utf-8"?>
+<p:notes xmlns:a="http://schemas.openxmlformats.org/drawingml/2006/main" xmlns:r="http://schemas.openxmlformats.org/officeDocument/2006/relationships" xmlns:p="http://schemas.openxmlformats.org/presentationml/2006/main">
+  <p:cSld>
+    <p:spTree>
+      <p:nvGrpSpPr>
+        <p:cNvPr id="1" name=""/>
+        <p:cNvGrpSpPr/>
+        <p:nvPr/>
+      </p:nvGrpSpPr>
+      <p:grpSpPr>
+        <a:xfrm>
+          <a:off x="0" y="0"/>
+          <a:ext cx="0" cy="0"/>
+          <a:chOff x="0" y="0"/>
+          <a:chExt cx="0" cy="0"/>
+        </a:xfrm>
+      </p:grpSpPr>
+      <p:sp>
+        <p:nvSpPr>
+          <p:cNvPr id="2" name="Slide Image Placeholder 1"/>
+          <p:cNvSpPr>
+            <a:spLocks noGrp="1" noRot="1" noChangeAspect="1"/>
+          </p:cNvSpPr>
+          <p:nvPr>
+            <p:ph type="sldImg"/>
+          </p:nvPr>
+        </p:nvSpPr>
+        <p:spPr/>
+      </p:sp>
+      <p:sp>
+        <p:nvSpPr>
+          <p:cNvPr id="3" name="Notes Placeholder 2"/>
+          <p:cNvSpPr>
+            <a:spLocks noGrp="1"/>
+          </p:cNvSpPr>
+          <p:nvPr>
+            <p:ph type="body" idx="1"/>
+          </p:nvPr>
+        </p:nvSpPr>
+        <p:spPr/>
+        <p:txBody>
+          <a:bodyPr/>
+          <a:lstStyle/>
+          <a:p>
+            <a:r>
+              <a:rPr lang="en-US" dirty="0" smtClean="0"/>
+              <a:t>Sockets are</a:t>
+            </a:r>
+            <a:r>
+              <a:rPr lang="en-US" baseline="0" dirty="0" smtClean="0"/>
+              <a:t> created from the Context.  There should be only one context created in the process, which is then used to create all of the sockets used by the application.  Sockets are asynchronous internally, but are not thread-safe and should only be used from a single thread.</a:t>
+            </a:r>
+          </a:p>
+          <a:p>
+            <a:endParaRPr lang="en-US" baseline="0" dirty="0" smtClean="0"/>
+          </a:p>
+        </p:txBody>
+      </p:sp>
+      <p:sp>
+        <p:nvSpPr>
+          <p:cNvPr id="4" name="Slide Number Placeholder 3"/>
+          <p:cNvSpPr>
+            <a:spLocks noGrp="1"/>
+          </p:cNvSpPr>
+          <p:nvPr>
+            <p:ph type="sldNum" sz="quarter" idx="10"/>
+          </p:nvPr>
+        </p:nvSpPr>
+        <p:spPr/>
+        <p:txBody>
+          <a:bodyPr/>
+          <a:lstStyle/>
+          <a:p>
+            <a:fld id="{1B2508BA-5CC2-4344-A11F-861340D98E55}" type="slidenum">
+              <a:rPr lang="en-US" smtClean="0"/>
+              <a:t>4</a:t>
+            </a:fld>
+            <a:endParaRPr lang="en-US"/>
+          </a:p>
+        </p:txBody>
+      </p:sp>
+    </p:spTree>
+    <p:extLst>
+      <p:ext uri="{BB962C8B-B14F-4D97-AF65-F5344CB8AC3E}">
+        <p14:creationId xmlns:p14="http://schemas.microsoft.com/office/powerpoint/2010/main" val="2559511563"/>
+      </p:ext>
+    </p:extLst>
+  </p:cSld>
+  <p:clrMapOvr>
+    <a:masterClrMapping/>
+  </p:clrMapOvr>
+</p:notes>
 </file>
 
 <file path=ppt/slideLayouts/slideLayout1.xml><?xml version="1.0" encoding="utf-8"?>
@@ -5932,6 +6380,9 @@
   <p:clrMapOvr>
     <a:masterClrMapping/>
   </p:clrMapOvr>
+  <p:transition>
+    <p:fade/>
+  </p:transition>
   <p:timing>
     <p:tnLst>
       <p:par>
@@ -5976,6 +6427,1075 @@
           <a:p>
             <a:r>
               <a:rPr lang="en-US" dirty="0" smtClean="0"/>
+              <a:t>Scaling</a:t>
+            </a:r>
+            <a:endParaRPr lang="en-US" dirty="0"/>
+          </a:p>
+        </p:txBody>
+      </p:sp>
+      <p:grpSp>
+        <p:nvGrpSpPr>
+          <p:cNvPr id="7" name="Group 6"/>
+          <p:cNvGrpSpPr/>
+          <p:nvPr/>
+        </p:nvGrpSpPr>
+        <p:grpSpPr>
+          <a:xfrm>
+            <a:off x="1623956" y="4968237"/>
+            <a:ext cx="1280160" cy="1280160"/>
+            <a:chOff x="584" y="367456"/>
+            <a:chExt cx="2313086" cy="2313086"/>
+          </a:xfrm>
+        </p:grpSpPr>
+        <p:sp>
+          <p:nvSpPr>
+            <p:cNvPr id="8" name="Oval 7"/>
+            <p:cNvSpPr/>
+            <p:nvPr/>
+          </p:nvSpPr>
+          <p:spPr>
+            <a:xfrm>
+              <a:off x="584" y="367456"/>
+              <a:ext cx="2313086" cy="2313086"/>
+            </a:xfrm>
+            <a:prstGeom prst="ellipse">
+              <a:avLst/>
+            </a:prstGeom>
+          </p:spPr>
+          <p:style>
+            <a:lnRef idx="2">
+              <a:schemeClr val="lt1">
+                <a:hueOff val="0"/>
+                <a:satOff val="0"/>
+                <a:lumOff val="0"/>
+                <a:alphaOff val="0"/>
+              </a:schemeClr>
+            </a:lnRef>
+            <a:fillRef idx="1">
+              <a:schemeClr val="accent5">
+                <a:hueOff val="0"/>
+                <a:satOff val="0"/>
+                <a:lumOff val="0"/>
+                <a:alphaOff val="0"/>
+              </a:schemeClr>
+            </a:fillRef>
+            <a:effectRef idx="0">
+              <a:schemeClr val="accent5">
+                <a:hueOff val="0"/>
+                <a:satOff val="0"/>
+                <a:lumOff val="0"/>
+                <a:alphaOff val="0"/>
+              </a:schemeClr>
+            </a:effectRef>
+            <a:fontRef idx="minor">
+              <a:schemeClr val="lt1"/>
+            </a:fontRef>
+          </p:style>
+        </p:sp>
+        <p:sp>
+          <p:nvSpPr>
+            <p:cNvPr id="9" name="Oval 4"/>
+            <p:cNvSpPr/>
+            <p:nvPr/>
+          </p:nvSpPr>
+          <p:spPr>
+            <a:xfrm>
+              <a:off x="339328" y="706200"/>
+              <a:ext cx="1635598" cy="1635598"/>
+            </a:xfrm>
+            <a:prstGeom prst="rect">
+              <a:avLst/>
+            </a:prstGeom>
+          </p:spPr>
+          <p:style>
+            <a:lnRef idx="0">
+              <a:scrgbClr r="0" g="0" b="0"/>
+            </a:lnRef>
+            <a:fillRef idx="0">
+              <a:scrgbClr r="0" g="0" b="0"/>
+            </a:fillRef>
+            <a:effectRef idx="0">
+              <a:scrgbClr r="0" g="0" b="0"/>
+            </a:effectRef>
+            <a:fontRef idx="minor">
+              <a:schemeClr val="lt1"/>
+            </a:fontRef>
+          </p:style>
+          <p:txBody>
+            <a:bodyPr spcFirstLastPara="0" vert="horz" wrap="square" lIns="40640" tIns="40640" rIns="40640" bIns="40640" numCol="1" spcCol="1270" anchor="ctr" anchorCtr="0">
+              <a:noAutofit/>
+            </a:bodyPr>
+            <a:lstStyle/>
+            <a:p>
+              <a:pPr lvl="0" algn="ctr" defTabSz="1422400">
+                <a:lnSpc>
+                  <a:spcPct val="90000"/>
+                </a:lnSpc>
+                <a:spcBef>
+                  <a:spcPct val="0"/>
+                </a:spcBef>
+                <a:spcAft>
+                  <a:spcPct val="35000"/>
+                </a:spcAft>
+              </a:pPr>
+              <a:r>
+                <a:rPr lang="en-US" sz="2800" kern="1200" dirty="0" smtClean="0"/>
+                <a:t>REP</a:t>
+              </a:r>
+              <a:endParaRPr lang="en-US" sz="2800" kern="1200" dirty="0"/>
+            </a:p>
+          </p:txBody>
+        </p:sp>
+      </p:grpSp>
+      <p:grpSp>
+        <p:nvGrpSpPr>
+          <p:cNvPr id="10" name="Group 9"/>
+          <p:cNvGrpSpPr/>
+          <p:nvPr/>
+        </p:nvGrpSpPr>
+        <p:grpSpPr>
+          <a:xfrm>
+            <a:off x="3641308" y="4968240"/>
+            <a:ext cx="1280160" cy="1280160"/>
+            <a:chOff x="584" y="367456"/>
+            <a:chExt cx="2313086" cy="2313086"/>
+          </a:xfrm>
+        </p:grpSpPr>
+        <p:sp>
+          <p:nvSpPr>
+            <p:cNvPr id="11" name="Oval 10"/>
+            <p:cNvSpPr/>
+            <p:nvPr/>
+          </p:nvSpPr>
+          <p:spPr>
+            <a:xfrm>
+              <a:off x="584" y="367456"/>
+              <a:ext cx="2313086" cy="2313086"/>
+            </a:xfrm>
+            <a:prstGeom prst="ellipse">
+              <a:avLst/>
+            </a:prstGeom>
+          </p:spPr>
+          <p:style>
+            <a:lnRef idx="2">
+              <a:schemeClr val="lt1">
+                <a:hueOff val="0"/>
+                <a:satOff val="0"/>
+                <a:lumOff val="0"/>
+                <a:alphaOff val="0"/>
+              </a:schemeClr>
+            </a:lnRef>
+            <a:fillRef idx="1">
+              <a:schemeClr val="accent5">
+                <a:hueOff val="0"/>
+                <a:satOff val="0"/>
+                <a:lumOff val="0"/>
+                <a:alphaOff val="0"/>
+              </a:schemeClr>
+            </a:fillRef>
+            <a:effectRef idx="0">
+              <a:schemeClr val="accent5">
+                <a:hueOff val="0"/>
+                <a:satOff val="0"/>
+                <a:lumOff val="0"/>
+                <a:alphaOff val="0"/>
+              </a:schemeClr>
+            </a:effectRef>
+            <a:fontRef idx="minor">
+              <a:schemeClr val="lt1"/>
+            </a:fontRef>
+          </p:style>
+        </p:sp>
+        <p:sp>
+          <p:nvSpPr>
+            <p:cNvPr id="12" name="Oval 4"/>
+            <p:cNvSpPr/>
+            <p:nvPr/>
+          </p:nvSpPr>
+          <p:spPr>
+            <a:xfrm>
+              <a:off x="339328" y="706200"/>
+              <a:ext cx="1635598" cy="1635598"/>
+            </a:xfrm>
+            <a:prstGeom prst="rect">
+              <a:avLst/>
+            </a:prstGeom>
+          </p:spPr>
+          <p:style>
+            <a:lnRef idx="0">
+              <a:scrgbClr r="0" g="0" b="0"/>
+            </a:lnRef>
+            <a:fillRef idx="0">
+              <a:scrgbClr r="0" g="0" b="0"/>
+            </a:fillRef>
+            <a:effectRef idx="0">
+              <a:scrgbClr r="0" g="0" b="0"/>
+            </a:effectRef>
+            <a:fontRef idx="minor">
+              <a:schemeClr val="lt1"/>
+            </a:fontRef>
+          </p:style>
+          <p:txBody>
+            <a:bodyPr spcFirstLastPara="0" vert="horz" wrap="square" lIns="40640" tIns="40640" rIns="40640" bIns="40640" numCol="1" spcCol="1270" anchor="ctr" anchorCtr="0">
+              <a:noAutofit/>
+            </a:bodyPr>
+            <a:lstStyle/>
+            <a:p>
+              <a:pPr lvl="0" algn="ctr" defTabSz="1422400">
+                <a:lnSpc>
+                  <a:spcPct val="90000"/>
+                </a:lnSpc>
+                <a:spcBef>
+                  <a:spcPct val="0"/>
+                </a:spcBef>
+                <a:spcAft>
+                  <a:spcPct val="35000"/>
+                </a:spcAft>
+              </a:pPr>
+              <a:r>
+                <a:rPr lang="en-US" sz="2800" kern="1200" dirty="0" smtClean="0"/>
+                <a:t>REP</a:t>
+              </a:r>
+              <a:endParaRPr lang="en-US" sz="2800" kern="1200" dirty="0"/>
+            </a:p>
+          </p:txBody>
+        </p:sp>
+      </p:grpSp>
+      <p:grpSp>
+        <p:nvGrpSpPr>
+          <p:cNvPr id="13" name="Group 12"/>
+          <p:cNvGrpSpPr/>
+          <p:nvPr/>
+        </p:nvGrpSpPr>
+        <p:grpSpPr>
+          <a:xfrm>
+            <a:off x="5698797" y="4968240"/>
+            <a:ext cx="1280160" cy="1280160"/>
+            <a:chOff x="584" y="367456"/>
+            <a:chExt cx="2313086" cy="2313086"/>
+          </a:xfrm>
+        </p:grpSpPr>
+        <p:sp>
+          <p:nvSpPr>
+            <p:cNvPr id="14" name="Oval 13"/>
+            <p:cNvSpPr/>
+            <p:nvPr/>
+          </p:nvSpPr>
+          <p:spPr>
+            <a:xfrm>
+              <a:off x="584" y="367456"/>
+              <a:ext cx="2313086" cy="2313086"/>
+            </a:xfrm>
+            <a:prstGeom prst="ellipse">
+              <a:avLst/>
+            </a:prstGeom>
+          </p:spPr>
+          <p:style>
+            <a:lnRef idx="2">
+              <a:schemeClr val="lt1">
+                <a:hueOff val="0"/>
+                <a:satOff val="0"/>
+                <a:lumOff val="0"/>
+                <a:alphaOff val="0"/>
+              </a:schemeClr>
+            </a:lnRef>
+            <a:fillRef idx="1">
+              <a:schemeClr val="accent5">
+                <a:hueOff val="0"/>
+                <a:satOff val="0"/>
+                <a:lumOff val="0"/>
+                <a:alphaOff val="0"/>
+              </a:schemeClr>
+            </a:fillRef>
+            <a:effectRef idx="0">
+              <a:schemeClr val="accent5">
+                <a:hueOff val="0"/>
+                <a:satOff val="0"/>
+                <a:lumOff val="0"/>
+                <a:alphaOff val="0"/>
+              </a:schemeClr>
+            </a:effectRef>
+            <a:fontRef idx="minor">
+              <a:schemeClr val="lt1"/>
+            </a:fontRef>
+          </p:style>
+        </p:sp>
+        <p:sp>
+          <p:nvSpPr>
+            <p:cNvPr id="15" name="Oval 4"/>
+            <p:cNvSpPr/>
+            <p:nvPr/>
+          </p:nvSpPr>
+          <p:spPr>
+            <a:xfrm>
+              <a:off x="339328" y="706200"/>
+              <a:ext cx="1635598" cy="1635598"/>
+            </a:xfrm>
+            <a:prstGeom prst="rect">
+              <a:avLst/>
+            </a:prstGeom>
+          </p:spPr>
+          <p:style>
+            <a:lnRef idx="0">
+              <a:scrgbClr r="0" g="0" b="0"/>
+            </a:lnRef>
+            <a:fillRef idx="0">
+              <a:scrgbClr r="0" g="0" b="0"/>
+            </a:fillRef>
+            <a:effectRef idx="0">
+              <a:scrgbClr r="0" g="0" b="0"/>
+            </a:effectRef>
+            <a:fontRef idx="minor">
+              <a:schemeClr val="lt1"/>
+            </a:fontRef>
+          </p:style>
+          <p:txBody>
+            <a:bodyPr spcFirstLastPara="0" vert="horz" wrap="square" lIns="40640" tIns="40640" rIns="40640" bIns="40640" numCol="1" spcCol="1270" anchor="ctr" anchorCtr="0">
+              <a:noAutofit/>
+            </a:bodyPr>
+            <a:lstStyle/>
+            <a:p>
+              <a:pPr lvl="0" algn="ctr" defTabSz="1422400">
+                <a:lnSpc>
+                  <a:spcPct val="90000"/>
+                </a:lnSpc>
+                <a:spcBef>
+                  <a:spcPct val="0"/>
+                </a:spcBef>
+                <a:spcAft>
+                  <a:spcPct val="35000"/>
+                </a:spcAft>
+              </a:pPr>
+              <a:r>
+                <a:rPr lang="en-US" sz="2800" kern="1200" dirty="0" smtClean="0"/>
+                <a:t>REP</a:t>
+              </a:r>
+              <a:endParaRPr lang="en-US" sz="2800" kern="1200" dirty="0"/>
+            </a:p>
+          </p:txBody>
+        </p:sp>
+      </p:grpSp>
+      <p:grpSp>
+        <p:nvGrpSpPr>
+          <p:cNvPr id="16" name="Group 15"/>
+          <p:cNvGrpSpPr/>
+          <p:nvPr/>
+        </p:nvGrpSpPr>
+        <p:grpSpPr>
+          <a:xfrm>
+            <a:off x="1623956" y="1619735"/>
+            <a:ext cx="1280160" cy="1280160"/>
+            <a:chOff x="584" y="367456"/>
+            <a:chExt cx="2313086" cy="2313086"/>
+          </a:xfrm>
+        </p:grpSpPr>
+        <p:sp>
+          <p:nvSpPr>
+            <p:cNvPr id="17" name="Oval 16"/>
+            <p:cNvSpPr/>
+            <p:nvPr/>
+          </p:nvSpPr>
+          <p:spPr>
+            <a:xfrm>
+              <a:off x="584" y="367456"/>
+              <a:ext cx="2313086" cy="2313086"/>
+            </a:xfrm>
+            <a:prstGeom prst="ellipse">
+              <a:avLst/>
+            </a:prstGeom>
+          </p:spPr>
+          <p:style>
+            <a:lnRef idx="2">
+              <a:schemeClr val="lt1">
+                <a:hueOff val="0"/>
+                <a:satOff val="0"/>
+                <a:lumOff val="0"/>
+                <a:alphaOff val="0"/>
+              </a:schemeClr>
+            </a:lnRef>
+            <a:fillRef idx="1">
+              <a:schemeClr val="accent5">
+                <a:hueOff val="0"/>
+                <a:satOff val="0"/>
+                <a:lumOff val="0"/>
+                <a:alphaOff val="0"/>
+              </a:schemeClr>
+            </a:fillRef>
+            <a:effectRef idx="0">
+              <a:schemeClr val="accent5">
+                <a:hueOff val="0"/>
+                <a:satOff val="0"/>
+                <a:lumOff val="0"/>
+                <a:alphaOff val="0"/>
+              </a:schemeClr>
+            </a:effectRef>
+            <a:fontRef idx="minor">
+              <a:schemeClr val="lt1"/>
+            </a:fontRef>
+          </p:style>
+        </p:sp>
+        <p:sp>
+          <p:nvSpPr>
+            <p:cNvPr id="18" name="Oval 4"/>
+            <p:cNvSpPr/>
+            <p:nvPr/>
+          </p:nvSpPr>
+          <p:spPr>
+            <a:xfrm>
+              <a:off x="339328" y="706200"/>
+              <a:ext cx="1635598" cy="1635598"/>
+            </a:xfrm>
+            <a:prstGeom prst="rect">
+              <a:avLst/>
+            </a:prstGeom>
+          </p:spPr>
+          <p:style>
+            <a:lnRef idx="0">
+              <a:scrgbClr r="0" g="0" b="0"/>
+            </a:lnRef>
+            <a:fillRef idx="0">
+              <a:scrgbClr r="0" g="0" b="0"/>
+            </a:fillRef>
+            <a:effectRef idx="0">
+              <a:scrgbClr r="0" g="0" b="0"/>
+            </a:effectRef>
+            <a:fontRef idx="minor">
+              <a:schemeClr val="lt1"/>
+            </a:fontRef>
+          </p:style>
+          <p:txBody>
+            <a:bodyPr spcFirstLastPara="0" vert="horz" wrap="square" lIns="40640" tIns="40640" rIns="40640" bIns="40640" numCol="1" spcCol="1270" anchor="ctr" anchorCtr="0">
+              <a:noAutofit/>
+            </a:bodyPr>
+            <a:lstStyle/>
+            <a:p>
+              <a:pPr lvl="0" algn="ctr" defTabSz="1422400">
+                <a:lnSpc>
+                  <a:spcPct val="90000"/>
+                </a:lnSpc>
+                <a:spcBef>
+                  <a:spcPct val="0"/>
+                </a:spcBef>
+                <a:spcAft>
+                  <a:spcPct val="35000"/>
+                </a:spcAft>
+              </a:pPr>
+              <a:r>
+                <a:rPr lang="en-US" sz="2800" kern="1200" dirty="0" smtClean="0"/>
+                <a:t>REQ</a:t>
+              </a:r>
+              <a:endParaRPr lang="en-US" sz="2800" kern="1200" dirty="0"/>
+            </a:p>
+          </p:txBody>
+        </p:sp>
+      </p:grpSp>
+      <p:grpSp>
+        <p:nvGrpSpPr>
+          <p:cNvPr id="28" name="Group 27"/>
+          <p:cNvGrpSpPr/>
+          <p:nvPr/>
+        </p:nvGrpSpPr>
+        <p:grpSpPr>
+          <a:xfrm>
+            <a:off x="3641308" y="1619734"/>
+            <a:ext cx="1280160" cy="1280160"/>
+            <a:chOff x="584" y="367456"/>
+            <a:chExt cx="2313086" cy="2313086"/>
+          </a:xfrm>
+        </p:grpSpPr>
+        <p:sp>
+          <p:nvSpPr>
+            <p:cNvPr id="29" name="Oval 28"/>
+            <p:cNvSpPr/>
+            <p:nvPr/>
+          </p:nvSpPr>
+          <p:spPr>
+            <a:xfrm>
+              <a:off x="584" y="367456"/>
+              <a:ext cx="2313086" cy="2313086"/>
+            </a:xfrm>
+            <a:prstGeom prst="ellipse">
+              <a:avLst/>
+            </a:prstGeom>
+          </p:spPr>
+          <p:style>
+            <a:lnRef idx="2">
+              <a:schemeClr val="lt1">
+                <a:hueOff val="0"/>
+                <a:satOff val="0"/>
+                <a:lumOff val="0"/>
+                <a:alphaOff val="0"/>
+              </a:schemeClr>
+            </a:lnRef>
+            <a:fillRef idx="1">
+              <a:schemeClr val="accent5">
+                <a:hueOff val="0"/>
+                <a:satOff val="0"/>
+                <a:lumOff val="0"/>
+                <a:alphaOff val="0"/>
+              </a:schemeClr>
+            </a:fillRef>
+            <a:effectRef idx="0">
+              <a:schemeClr val="accent5">
+                <a:hueOff val="0"/>
+                <a:satOff val="0"/>
+                <a:lumOff val="0"/>
+                <a:alphaOff val="0"/>
+              </a:schemeClr>
+            </a:effectRef>
+            <a:fontRef idx="minor">
+              <a:schemeClr val="lt1"/>
+            </a:fontRef>
+          </p:style>
+        </p:sp>
+        <p:sp>
+          <p:nvSpPr>
+            <p:cNvPr id="30" name="Oval 4"/>
+            <p:cNvSpPr/>
+            <p:nvPr/>
+          </p:nvSpPr>
+          <p:spPr>
+            <a:xfrm>
+              <a:off x="339328" y="706200"/>
+              <a:ext cx="1635598" cy="1635598"/>
+            </a:xfrm>
+            <a:prstGeom prst="rect">
+              <a:avLst/>
+            </a:prstGeom>
+          </p:spPr>
+          <p:style>
+            <a:lnRef idx="0">
+              <a:scrgbClr r="0" g="0" b="0"/>
+            </a:lnRef>
+            <a:fillRef idx="0">
+              <a:scrgbClr r="0" g="0" b="0"/>
+            </a:fillRef>
+            <a:effectRef idx="0">
+              <a:scrgbClr r="0" g="0" b="0"/>
+            </a:effectRef>
+            <a:fontRef idx="minor">
+              <a:schemeClr val="lt1"/>
+            </a:fontRef>
+          </p:style>
+          <p:txBody>
+            <a:bodyPr spcFirstLastPara="0" vert="horz" wrap="square" lIns="40640" tIns="40640" rIns="40640" bIns="40640" numCol="1" spcCol="1270" anchor="ctr" anchorCtr="0">
+              <a:noAutofit/>
+            </a:bodyPr>
+            <a:lstStyle/>
+            <a:p>
+              <a:pPr lvl="0" algn="ctr" defTabSz="1422400">
+                <a:lnSpc>
+                  <a:spcPct val="90000"/>
+                </a:lnSpc>
+                <a:spcBef>
+                  <a:spcPct val="0"/>
+                </a:spcBef>
+                <a:spcAft>
+                  <a:spcPct val="35000"/>
+                </a:spcAft>
+              </a:pPr>
+              <a:r>
+                <a:rPr lang="en-US" sz="2800" kern="1200" dirty="0" smtClean="0"/>
+                <a:t>REQ</a:t>
+              </a:r>
+              <a:endParaRPr lang="en-US" sz="2800" kern="1200" dirty="0"/>
+            </a:p>
+          </p:txBody>
+        </p:sp>
+      </p:grpSp>
+      <p:grpSp>
+        <p:nvGrpSpPr>
+          <p:cNvPr id="31" name="Group 30"/>
+          <p:cNvGrpSpPr/>
+          <p:nvPr/>
+        </p:nvGrpSpPr>
+        <p:grpSpPr>
+          <a:xfrm>
+            <a:off x="5698797" y="1619733"/>
+            <a:ext cx="1280160" cy="1280160"/>
+            <a:chOff x="584" y="367456"/>
+            <a:chExt cx="2313086" cy="2313086"/>
+          </a:xfrm>
+        </p:grpSpPr>
+        <p:sp>
+          <p:nvSpPr>
+            <p:cNvPr id="32" name="Oval 31"/>
+            <p:cNvSpPr/>
+            <p:nvPr/>
+          </p:nvSpPr>
+          <p:spPr>
+            <a:xfrm>
+              <a:off x="584" y="367456"/>
+              <a:ext cx="2313086" cy="2313086"/>
+            </a:xfrm>
+            <a:prstGeom prst="ellipse">
+              <a:avLst/>
+            </a:prstGeom>
+          </p:spPr>
+          <p:style>
+            <a:lnRef idx="2">
+              <a:schemeClr val="lt1">
+                <a:hueOff val="0"/>
+                <a:satOff val="0"/>
+                <a:lumOff val="0"/>
+                <a:alphaOff val="0"/>
+              </a:schemeClr>
+            </a:lnRef>
+            <a:fillRef idx="1">
+              <a:schemeClr val="accent5">
+                <a:hueOff val="0"/>
+                <a:satOff val="0"/>
+                <a:lumOff val="0"/>
+                <a:alphaOff val="0"/>
+              </a:schemeClr>
+            </a:fillRef>
+            <a:effectRef idx="0">
+              <a:schemeClr val="accent5">
+                <a:hueOff val="0"/>
+                <a:satOff val="0"/>
+                <a:lumOff val="0"/>
+                <a:alphaOff val="0"/>
+              </a:schemeClr>
+            </a:effectRef>
+            <a:fontRef idx="minor">
+              <a:schemeClr val="lt1"/>
+            </a:fontRef>
+          </p:style>
+        </p:sp>
+        <p:sp>
+          <p:nvSpPr>
+            <p:cNvPr id="33" name="Oval 4"/>
+            <p:cNvSpPr/>
+            <p:nvPr/>
+          </p:nvSpPr>
+          <p:spPr>
+            <a:xfrm>
+              <a:off x="339328" y="706200"/>
+              <a:ext cx="1635598" cy="1635598"/>
+            </a:xfrm>
+            <a:prstGeom prst="rect">
+              <a:avLst/>
+            </a:prstGeom>
+          </p:spPr>
+          <p:style>
+            <a:lnRef idx="0">
+              <a:scrgbClr r="0" g="0" b="0"/>
+            </a:lnRef>
+            <a:fillRef idx="0">
+              <a:scrgbClr r="0" g="0" b="0"/>
+            </a:fillRef>
+            <a:effectRef idx="0">
+              <a:scrgbClr r="0" g="0" b="0"/>
+            </a:effectRef>
+            <a:fontRef idx="minor">
+              <a:schemeClr val="lt1"/>
+            </a:fontRef>
+          </p:style>
+          <p:txBody>
+            <a:bodyPr spcFirstLastPara="0" vert="horz" wrap="square" lIns="40640" tIns="40640" rIns="40640" bIns="40640" numCol="1" spcCol="1270" anchor="ctr" anchorCtr="0">
+              <a:noAutofit/>
+            </a:bodyPr>
+            <a:lstStyle/>
+            <a:p>
+              <a:pPr lvl="0" algn="ctr" defTabSz="1422400">
+                <a:lnSpc>
+                  <a:spcPct val="90000"/>
+                </a:lnSpc>
+                <a:spcBef>
+                  <a:spcPct val="0"/>
+                </a:spcBef>
+                <a:spcAft>
+                  <a:spcPct val="35000"/>
+                </a:spcAft>
+              </a:pPr>
+              <a:r>
+                <a:rPr lang="en-US" sz="2800" kern="1200" dirty="0" smtClean="0"/>
+                <a:t>REQ</a:t>
+              </a:r>
+              <a:endParaRPr lang="en-US" sz="2800" kern="1200" dirty="0"/>
+            </a:p>
+          </p:txBody>
+        </p:sp>
+      </p:grpSp>
+      <p:grpSp>
+        <p:nvGrpSpPr>
+          <p:cNvPr id="34" name="Group 33"/>
+          <p:cNvGrpSpPr/>
+          <p:nvPr/>
+        </p:nvGrpSpPr>
+        <p:grpSpPr>
+          <a:xfrm>
+            <a:off x="3629148" y="3261977"/>
+            <a:ext cx="1304481" cy="1304481"/>
+            <a:chOff x="584" y="367456"/>
+            <a:chExt cx="2313086" cy="2313086"/>
+          </a:xfrm>
+        </p:grpSpPr>
+        <p:sp>
+          <p:nvSpPr>
+            <p:cNvPr id="35" name="Oval 34"/>
+            <p:cNvSpPr/>
+            <p:nvPr/>
+          </p:nvSpPr>
+          <p:spPr>
+            <a:xfrm>
+              <a:off x="584" y="367456"/>
+              <a:ext cx="2313086" cy="2313086"/>
+            </a:xfrm>
+            <a:prstGeom prst="roundRect">
+              <a:avLst/>
+            </a:prstGeom>
+          </p:spPr>
+          <p:style>
+            <a:lnRef idx="2">
+              <a:schemeClr val="lt1">
+                <a:hueOff val="0"/>
+                <a:satOff val="0"/>
+                <a:lumOff val="0"/>
+                <a:alphaOff val="0"/>
+              </a:schemeClr>
+            </a:lnRef>
+            <a:fillRef idx="1">
+              <a:schemeClr val="accent5">
+                <a:hueOff val="0"/>
+                <a:satOff val="0"/>
+                <a:lumOff val="0"/>
+                <a:alphaOff val="0"/>
+              </a:schemeClr>
+            </a:fillRef>
+            <a:effectRef idx="0">
+              <a:schemeClr val="accent5">
+                <a:hueOff val="0"/>
+                <a:satOff val="0"/>
+                <a:lumOff val="0"/>
+                <a:alphaOff val="0"/>
+              </a:schemeClr>
+            </a:effectRef>
+            <a:fontRef idx="minor">
+              <a:schemeClr val="lt1"/>
+            </a:fontRef>
+          </p:style>
+          <p:txBody>
+            <a:bodyPr anchor="ctr"/>
+            <a:lstStyle/>
+            <a:p>
+              <a:pPr algn="ctr"/>
+              <a:r>
+                <a:rPr lang="en-US" sz="2800" dirty="0" smtClean="0"/>
+                <a:t>Proxy</a:t>
+              </a:r>
+              <a:endParaRPr lang="en-US" sz="2800" dirty="0"/>
+            </a:p>
+          </p:txBody>
+        </p:sp>
+        <p:sp>
+          <p:nvSpPr>
+            <p:cNvPr id="36" name="Oval 4"/>
+            <p:cNvSpPr/>
+            <p:nvPr/>
+          </p:nvSpPr>
+          <p:spPr>
+            <a:xfrm>
+              <a:off x="339328" y="706200"/>
+              <a:ext cx="1635598" cy="1635598"/>
+            </a:xfrm>
+            <a:prstGeom prst="roundRect">
+              <a:avLst/>
+            </a:prstGeom>
+          </p:spPr>
+          <p:style>
+            <a:lnRef idx="0">
+              <a:scrgbClr r="0" g="0" b="0"/>
+            </a:lnRef>
+            <a:fillRef idx="0">
+              <a:scrgbClr r="0" g="0" b="0"/>
+            </a:fillRef>
+            <a:effectRef idx="0">
+              <a:scrgbClr r="0" g="0" b="0"/>
+            </a:effectRef>
+            <a:fontRef idx="minor">
+              <a:schemeClr val="lt1"/>
+            </a:fontRef>
+          </p:style>
+          <p:txBody>
+            <a:bodyPr spcFirstLastPara="0" vert="horz" wrap="square" lIns="40640" tIns="40640" rIns="40640" bIns="40640" numCol="1" spcCol="1270" anchor="ctr" anchorCtr="0">
+              <a:noAutofit/>
+            </a:bodyPr>
+            <a:lstStyle/>
+            <a:p>
+              <a:pPr lvl="0" algn="ctr" defTabSz="1422400">
+                <a:lnSpc>
+                  <a:spcPct val="90000"/>
+                </a:lnSpc>
+                <a:spcBef>
+                  <a:spcPct val="0"/>
+                </a:spcBef>
+                <a:spcAft>
+                  <a:spcPct val="35000"/>
+                </a:spcAft>
+              </a:pPr>
+              <a:endParaRPr lang="en-US" sz="3200" kern="1200" dirty="0"/>
+            </a:p>
+          </p:txBody>
+        </p:sp>
+      </p:grpSp>
+      <p:cxnSp>
+        <p:nvCxnSpPr>
+          <p:cNvPr id="42" name="Elbow Connector 41"/>
+          <p:cNvCxnSpPr>
+            <a:stCxn id="17" idx="4"/>
+            <a:endCxn id="35" idx="0"/>
+          </p:cNvCxnSpPr>
+          <p:nvPr/>
+        </p:nvCxnSpPr>
+        <p:spPr>
+          <a:xfrm rot="16200000" flipH="1">
+            <a:off x="3091671" y="2072259"/>
+            <a:ext cx="362082" cy="2017353"/>
+          </a:xfrm>
+          <a:prstGeom prst="bentConnector3">
+            <a:avLst>
+              <a:gd name="adj1" fmla="val 50000"/>
+            </a:avLst>
+          </a:prstGeom>
+        </p:spPr>
+        <p:style>
+          <a:lnRef idx="1">
+            <a:schemeClr val="accent1"/>
+          </a:lnRef>
+          <a:fillRef idx="0">
+            <a:schemeClr val="accent1"/>
+          </a:fillRef>
+          <a:effectRef idx="0">
+            <a:schemeClr val="accent1"/>
+          </a:effectRef>
+          <a:fontRef idx="minor">
+            <a:schemeClr val="tx1"/>
+          </a:fontRef>
+        </p:style>
+      </p:cxnSp>
+      <p:cxnSp>
+        <p:nvCxnSpPr>
+          <p:cNvPr id="50" name="Straight Connector 49"/>
+          <p:cNvCxnSpPr>
+            <a:stCxn id="29" idx="4"/>
+            <a:endCxn id="35" idx="0"/>
+          </p:cNvCxnSpPr>
+          <p:nvPr/>
+        </p:nvCxnSpPr>
+        <p:spPr>
+          <a:xfrm>
+            <a:off x="4281388" y="2899894"/>
+            <a:ext cx="1" cy="362083"/>
+          </a:xfrm>
+          <a:prstGeom prst="line">
+            <a:avLst/>
+          </a:prstGeom>
+        </p:spPr>
+        <p:style>
+          <a:lnRef idx="1">
+            <a:schemeClr val="accent1"/>
+          </a:lnRef>
+          <a:fillRef idx="0">
+            <a:schemeClr val="accent1"/>
+          </a:fillRef>
+          <a:effectRef idx="0">
+            <a:schemeClr val="accent1"/>
+          </a:effectRef>
+          <a:fontRef idx="minor">
+            <a:schemeClr val="tx1"/>
+          </a:fontRef>
+        </p:style>
+      </p:cxnSp>
+      <p:cxnSp>
+        <p:nvCxnSpPr>
+          <p:cNvPr id="52" name="Elbow Connector 51"/>
+          <p:cNvCxnSpPr>
+            <a:stCxn id="32" idx="4"/>
+            <a:endCxn id="35" idx="0"/>
+          </p:cNvCxnSpPr>
+          <p:nvPr/>
+        </p:nvCxnSpPr>
+        <p:spPr>
+          <a:xfrm rot="5400000">
+            <a:off x="5129091" y="2052191"/>
+            <a:ext cx="362084" cy="2057488"/>
+          </a:xfrm>
+          <a:prstGeom prst="bentConnector3">
+            <a:avLst/>
+          </a:prstGeom>
+        </p:spPr>
+        <p:style>
+          <a:lnRef idx="1">
+            <a:schemeClr val="accent1"/>
+          </a:lnRef>
+          <a:fillRef idx="0">
+            <a:schemeClr val="accent1"/>
+          </a:fillRef>
+          <a:effectRef idx="0">
+            <a:schemeClr val="accent1"/>
+          </a:effectRef>
+          <a:fontRef idx="minor">
+            <a:schemeClr val="tx1"/>
+          </a:fontRef>
+        </p:style>
+      </p:cxnSp>
+      <p:cxnSp>
+        <p:nvCxnSpPr>
+          <p:cNvPr id="68" name="Elbow Connector 67"/>
+          <p:cNvCxnSpPr>
+            <a:stCxn id="11" idx="0"/>
+            <a:endCxn id="35" idx="2"/>
+          </p:cNvCxnSpPr>
+          <p:nvPr/>
+        </p:nvCxnSpPr>
+        <p:spPr>
+          <a:xfrm rot="5400000" flipH="1" flipV="1">
+            <a:off x="4080497" y="4767349"/>
+            <a:ext cx="401782" cy="1"/>
+          </a:xfrm>
+          <a:prstGeom prst="bentConnector3">
+            <a:avLst/>
+          </a:prstGeom>
+        </p:spPr>
+        <p:style>
+          <a:lnRef idx="1">
+            <a:schemeClr val="accent1"/>
+          </a:lnRef>
+          <a:fillRef idx="0">
+            <a:schemeClr val="accent1"/>
+          </a:fillRef>
+          <a:effectRef idx="0">
+            <a:schemeClr val="accent1"/>
+          </a:effectRef>
+          <a:fontRef idx="minor">
+            <a:schemeClr val="tx1"/>
+          </a:fontRef>
+        </p:style>
+      </p:cxnSp>
+      <p:cxnSp>
+        <p:nvCxnSpPr>
+          <p:cNvPr id="70" name="Elbow Connector 69"/>
+          <p:cNvCxnSpPr>
+            <a:stCxn id="8" idx="0"/>
+            <a:endCxn id="35" idx="2"/>
+          </p:cNvCxnSpPr>
+          <p:nvPr/>
+        </p:nvCxnSpPr>
+        <p:spPr>
+          <a:xfrm rot="5400000" flipH="1" flipV="1">
+            <a:off x="3071823" y="3758672"/>
+            <a:ext cx="401779" cy="2017353"/>
+          </a:xfrm>
+          <a:prstGeom prst="bentConnector3">
+            <a:avLst/>
+          </a:prstGeom>
+        </p:spPr>
+        <p:style>
+          <a:lnRef idx="1">
+            <a:schemeClr val="accent1"/>
+          </a:lnRef>
+          <a:fillRef idx="0">
+            <a:schemeClr val="accent1"/>
+          </a:fillRef>
+          <a:effectRef idx="0">
+            <a:schemeClr val="accent1"/>
+          </a:effectRef>
+          <a:fontRef idx="minor">
+            <a:schemeClr val="tx1"/>
+          </a:fontRef>
+        </p:style>
+      </p:cxnSp>
+      <p:cxnSp>
+        <p:nvCxnSpPr>
+          <p:cNvPr id="72" name="Elbow Connector 71"/>
+          <p:cNvCxnSpPr>
+            <a:stCxn id="35" idx="2"/>
+            <a:endCxn id="14" idx="0"/>
+          </p:cNvCxnSpPr>
+          <p:nvPr/>
+        </p:nvCxnSpPr>
+        <p:spPr>
+          <a:xfrm rot="16200000" flipH="1">
+            <a:off x="5109242" y="3738605"/>
+            <a:ext cx="401782" cy="2057488"/>
+          </a:xfrm>
+          <a:prstGeom prst="bentConnector3">
+            <a:avLst/>
+          </a:prstGeom>
+        </p:spPr>
+        <p:style>
+          <a:lnRef idx="1">
+            <a:schemeClr val="accent1"/>
+          </a:lnRef>
+          <a:fillRef idx="0">
+            <a:schemeClr val="accent1"/>
+          </a:fillRef>
+          <a:effectRef idx="0">
+            <a:schemeClr val="accent1"/>
+          </a:effectRef>
+          <a:fontRef idx="minor">
+            <a:schemeClr val="tx1"/>
+          </a:fontRef>
+        </p:style>
+      </p:cxnSp>
+    </p:spTree>
+    <p:extLst>
+      <p:ext uri="{BB962C8B-B14F-4D97-AF65-F5344CB8AC3E}">
+        <p14:creationId xmlns:p14="http://schemas.microsoft.com/office/powerpoint/2010/main" val="275046246"/>
+      </p:ext>
+    </p:extLst>
+  </p:cSld>
+  <p:clrMapOvr>
+    <a:masterClrMapping/>
+  </p:clrMapOvr>
+  <p:transition>
+    <p:fade/>
+  </p:transition>
+  <p:timing>
+    <p:tnLst>
+      <p:par>
+        <p:cTn id="1" dur="indefinite" restart="never" nodeType="tmRoot"/>
+      </p:par>
+    </p:tnLst>
+  </p:timing>
+</p:sld>
+</file>
+
+<file path=ppt/slides/slide11.xml><?xml version="1.0" encoding="utf-8"?>
+<p:sld xmlns:a="http://schemas.openxmlformats.org/drawingml/2006/main" xmlns:r="http://schemas.openxmlformats.org/officeDocument/2006/relationships" xmlns:p="http://schemas.openxmlformats.org/presentationml/2006/main">
+  <p:cSld>
+    <p:spTree>
+      <p:nvGrpSpPr>
+        <p:cNvPr id="1" name=""/>
+        <p:cNvGrpSpPr/>
+        <p:nvPr/>
+      </p:nvGrpSpPr>
+      <p:grpSpPr>
+        <a:xfrm>
+          <a:off x="0" y="0"/>
+          <a:ext cx="0" cy="0"/>
+          <a:chOff x="0" y="0"/>
+          <a:chExt cx="0" cy="0"/>
+        </a:xfrm>
+      </p:grpSpPr>
+      <p:sp>
+        <p:nvSpPr>
+          <p:cNvPr id="2" name="Title 1"/>
+          <p:cNvSpPr>
+            <a:spLocks noGrp="1"/>
+          </p:cNvSpPr>
+          <p:nvPr>
+            <p:ph type="title"/>
+          </p:nvPr>
+        </p:nvSpPr>
+        <p:spPr/>
+        <p:txBody>
+          <a:bodyPr/>
+          <a:lstStyle/>
+          <a:p>
+            <a:r>
+              <a:rPr lang="en-US" dirty="0" smtClean="0"/>
               <a:t>Resources</a:t>
             </a:r>
             <a:endParaRPr lang="en-US" dirty="0"/>
@@ -6060,6 +7580,9 @@
   <p:clrMapOvr>
     <a:masterClrMapping/>
   </p:clrMapOvr>
+  <p:transition>
+    <p:fade/>
+  </p:transition>
   <p:timing>
     <p:tnLst>
       <p:par>
@@ -6250,6 +7773,9 @@
   <p:clrMapOvr>
     <a:masterClrMapping/>
   </p:clrMapOvr>
+  <p:transition>
+    <p:fade/>
+  </p:transition>
   <p:timing>
     <p:tnLst>
       <p:par>
@@ -6377,6 +7903,9 @@
   <p:clrMapOvr>
     <a:masterClrMapping/>
   </p:clrMapOvr>
+  <p:transition>
+    <p:fade/>
+  </p:transition>
   <p:timing>
     <p:tnLst>
       <p:par>
@@ -6539,7 +8068,7 @@
           <p:nvPr/>
         </p:nvPicPr>
         <p:blipFill>
-          <a:blip r:embed="rId2">
+          <a:blip r:embed="rId3">
             <a:extLst>
               <a:ext uri="{28A0092B-C50C-407E-A947-70E740481C1C}">
                 <a14:useLocalDpi xmlns:a14="http://schemas.microsoft.com/office/drawing/2010/main" val="0"/>
@@ -6570,6 +8099,9 @@
   <p:clrMapOvr>
     <a:masterClrMapping/>
   </p:clrMapOvr>
+  <p:transition>
+    <p:fade/>
+  </p:transition>
   <p:timing>
     <p:tnLst>
       <p:par>
@@ -6767,6 +8299,16 @@
   <p:clrMapOvr>
     <a:masterClrMapping/>
   </p:clrMapOvr>
+  <p:transition>
+    <p:fade/>
+  </p:transition>
+  <p:timing>
+    <p:tnLst>
+      <p:par>
+        <p:cTn id="1" dur="indefinite" restart="never" nodeType="tmRoot"/>
+      </p:par>
+    </p:tnLst>
+  </p:timing>
 </p:sld>
 </file>
 
@@ -6954,6 +8496,9 @@
   <p:clrMapOvr>
     <a:masterClrMapping/>
   </p:clrMapOvr>
+  <p:transition>
+    <p:fade/>
+  </p:transition>
   <p:timing>
     <p:tnLst>
       <p:par>
@@ -7014,7 +8559,7 @@
             <p:ph idx="1"/>
             <p:extLst>
               <p:ext uri="{D42A27DB-BD31-4B8C-83A1-F6EECF244321}">
-                <p14:modId xmlns:p14="http://schemas.microsoft.com/office/powerpoint/2010/main" val="569216145"/>
+                <p14:modId xmlns:p14="http://schemas.microsoft.com/office/powerpoint/2010/main" val="1325127343"/>
               </p:ext>
             </p:extLst>
           </p:nvPr>
@@ -7039,6 +8584,9 @@
   <p:clrMapOvr>
     <a:masterClrMapping/>
   </p:clrMapOvr>
+  <p:transition>
+    <p:fade/>
+  </p:transition>
   <p:timing>
     <p:tnLst>
       <p:par>
@@ -7097,7 +8645,7 @@
         </p:nvGrpSpPr>
         <p:grpSpPr>
           <a:xfrm rot="5400000">
-            <a:off x="3827377" y="3698011"/>
+            <a:off x="3827377" y="3764368"/>
             <a:ext cx="949432" cy="431096"/>
             <a:chOff x="2133538" y="40517"/>
             <a:chExt cx="1442473" cy="780666"/>
@@ -7213,7 +8761,7 @@
         </p:nvGrpSpPr>
         <p:grpSpPr>
           <a:xfrm>
-            <a:off x="1976905" y="3847942"/>
+            <a:off x="1676400" y="3969658"/>
             <a:ext cx="1528295" cy="1528295"/>
             <a:chOff x="584" y="367456"/>
             <a:chExt cx="2313086" cy="2313086"/>
@@ -7312,7 +8860,7 @@
               </a:pPr>
               <a:r>
                 <a:rPr lang="en-US" sz="3200" kern="1200" dirty="0" smtClean="0"/>
-                <a:t>Sub</a:t>
+                <a:t>SUB</a:t>
               </a:r>
               <a:endParaRPr lang="en-US" sz="3200" kern="1200" dirty="0"/>
             </a:p>
@@ -7327,7 +8875,7 @@
         </p:nvGrpSpPr>
         <p:grpSpPr>
           <a:xfrm>
-            <a:off x="3537946" y="4388275"/>
+            <a:off x="3537946" y="4567705"/>
             <a:ext cx="1528295" cy="1528295"/>
             <a:chOff x="584" y="367456"/>
             <a:chExt cx="2313086" cy="2313086"/>
@@ -7426,7 +8974,7 @@
               </a:pPr>
               <a:r>
                 <a:rPr lang="en-US" sz="3200" kern="1200" dirty="0" smtClean="0"/>
-                <a:t>Sub</a:t>
+                <a:t>SUB</a:t>
               </a:r>
               <a:endParaRPr lang="en-US" sz="3200" kern="1200" dirty="0"/>
             </a:p>
@@ -7441,7 +8989,7 @@
         </p:nvGrpSpPr>
         <p:grpSpPr>
           <a:xfrm>
-            <a:off x="5158464" y="3847941"/>
+            <a:off x="5405905" y="3969658"/>
             <a:ext cx="1528295" cy="1528295"/>
             <a:chOff x="584" y="367456"/>
             <a:chExt cx="2313086" cy="2313086"/>
@@ -7540,7 +9088,7 @@
               </a:pPr>
               <a:r>
                 <a:rPr lang="en-US" sz="3200" kern="1200" dirty="0" smtClean="0"/>
-                <a:t>Sub</a:t>
+                <a:t>SUB</a:t>
               </a:r>
               <a:endParaRPr lang="en-US" sz="3200" kern="1200" dirty="0"/>
             </a:p>
@@ -7654,7 +9202,7 @@
               </a:pPr>
               <a:r>
                 <a:rPr lang="en-US" sz="3200" kern="1200" dirty="0" smtClean="0"/>
-                <a:t>Pub</a:t>
+                <a:t>PUB</a:t>
               </a:r>
               <a:endParaRPr lang="en-US" sz="3200" kern="1200" dirty="0"/>
             </a:p>
@@ -7668,8 +9216,8 @@
           <p:nvPr/>
         </p:nvGrpSpPr>
         <p:grpSpPr>
-          <a:xfrm rot="7537636">
-            <a:off x="3007124" y="3418210"/>
+          <a:xfrm rot="7846338">
+            <a:off x="2780314" y="3397559"/>
             <a:ext cx="949432" cy="431096"/>
             <a:chOff x="2133538" y="40517"/>
             <a:chExt cx="1442473" cy="780666"/>
@@ -7784,8 +9332,8 @@
           <p:nvPr/>
         </p:nvGrpSpPr>
         <p:grpSpPr>
-          <a:xfrm rot="3317478">
-            <a:off x="4674432" y="3423783"/>
+          <a:xfrm rot="3028462">
+            <a:off x="4827312" y="3483255"/>
             <a:ext cx="949432" cy="431096"/>
             <a:chOff x="2133538" y="40517"/>
             <a:chExt cx="1442473" cy="780666"/>
@@ -7903,6 +9451,9 @@
   <p:clrMapOvr>
     <a:masterClrMapping/>
   </p:clrMapOvr>
+  <p:transition>
+    <p:fade/>
+  </p:transition>
   <p:timing>
     <p:tnLst>
       <p:par>
@@ -8871,6 +10422,9 @@
   <p:clrMapOvr>
     <a:masterClrMapping/>
   </p:clrMapOvr>
+  <p:transition>
+    <p:fade/>
+  </p:transition>
   <p:timing>
     <p:tnLst>
       <p:par>
@@ -9132,4 +10686,289 @@
   <a:objectDefaults/>
   <a:extraClrSchemeLst/>
 </a:theme>
+</file>
+
+<file path=ppt/theme/theme2.xml><?xml version="1.0" encoding="utf-8"?>
+<a:theme xmlns:a="http://schemas.openxmlformats.org/drawingml/2006/main" name="Office Theme">
+  <a:themeElements>
+    <a:clrScheme name="Office">
+      <a:dk1>
+        <a:sysClr val="windowText" lastClr="000000"/>
+      </a:dk1>
+      <a:lt1>
+        <a:sysClr val="window" lastClr="FFFFFF"/>
+      </a:lt1>
+      <a:dk2>
+        <a:srgbClr val="1F497D"/>
+      </a:dk2>
+      <a:lt2>
+        <a:srgbClr val="EEECE1"/>
+      </a:lt2>
+      <a:accent1>
+        <a:srgbClr val="4F81BD"/>
+      </a:accent1>
+      <a:accent2>
+        <a:srgbClr val="C0504D"/>
+      </a:accent2>
+      <a:accent3>
+        <a:srgbClr val="9BBB59"/>
+      </a:accent3>
+      <a:accent4>
+        <a:srgbClr val="8064A2"/>
+      </a:accent4>
+      <a:accent5>
+        <a:srgbClr val="4BACC6"/>
+      </a:accent5>
+      <a:accent6>
+        <a:srgbClr val="F79646"/>
+      </a:accent6>
+      <a:hlink>
+        <a:srgbClr val="0000FF"/>
+      </a:hlink>
+      <a:folHlink>
+        <a:srgbClr val="800080"/>
+      </a:folHlink>
+    </a:clrScheme>
+    <a:fontScheme name="Office">
+      <a:majorFont>
+        <a:latin typeface="Calibri"/>
+        <a:ea typeface=""/>
+        <a:cs typeface=""/>
+        <a:font script="Jpan" typeface="ＭＳ Ｐゴシック"/>
+        <a:font script="Hang" typeface="맑은 고딕"/>
+        <a:font script="Hans" typeface="宋体"/>
+        <a:font script="Hant" typeface="新細明體"/>
+        <a:font script="Arab" typeface="Times New Roman"/>
+        <a:font script="Hebr" typeface="Times New Roman"/>
+        <a:font script="Thai" typeface="Angsana New"/>
+        <a:font script="Ethi" typeface="Nyala"/>
+        <a:font script="Beng" typeface="Vrinda"/>
+        <a:font script="Gujr" typeface="Shruti"/>
+        <a:font script="Khmr" typeface="MoolBoran"/>
+        <a:font script="Knda" typeface="Tunga"/>
+        <a:font script="Guru" typeface="Raavi"/>
+        <a:font script="Cans" typeface="Euphemia"/>
+        <a:font script="Cher" typeface="Plantagenet Cherokee"/>
+        <a:font script="Yiii" typeface="Microsoft Yi Baiti"/>
+        <a:font script="Tibt" typeface="Microsoft Himalaya"/>
+        <a:font script="Thaa" typeface="MV Boli"/>
+        <a:font script="Deva" typeface="Mangal"/>
+        <a:font script="Telu" typeface="Gautami"/>
+        <a:font script="Taml" typeface="Latha"/>
+        <a:font script="Syrc" typeface="Estrangelo Edessa"/>
+        <a:font script="Orya" typeface="Kalinga"/>
+        <a:font script="Mlym" typeface="Kartika"/>
+        <a:font script="Laoo" typeface="DokChampa"/>
+        <a:font script="Sinh" typeface="Iskoola Pota"/>
+        <a:font script="Mong" typeface="Mongolian Baiti"/>
+        <a:font script="Viet" typeface="Times New Roman"/>
+        <a:font script="Uigh" typeface="Microsoft Uighur"/>
+        <a:font script="Geor" typeface="Sylfaen"/>
+      </a:majorFont>
+      <a:minorFont>
+        <a:latin typeface="Calibri"/>
+        <a:ea typeface=""/>
+        <a:cs typeface=""/>
+        <a:font script="Jpan" typeface="ＭＳ Ｐゴシック"/>
+        <a:font script="Hang" typeface="맑은 고딕"/>
+        <a:font script="Hans" typeface="宋体"/>
+        <a:font script="Hant" typeface="新細明體"/>
+        <a:font script="Arab" typeface="Arial"/>
+        <a:font script="Hebr" typeface="Arial"/>
+        <a:font script="Thai" typeface="Cordia New"/>
+        <a:font script="Ethi" typeface="Nyala"/>
+        <a:font script="Beng" typeface="Vrinda"/>
+        <a:font script="Gujr" typeface="Shruti"/>
+        <a:font script="Khmr" typeface="DaunPenh"/>
+        <a:font script="Knda" typeface="Tunga"/>
+        <a:font script="Guru" typeface="Raavi"/>
+        <a:font script="Cans" typeface="Euphemia"/>
+        <a:font script="Cher" typeface="Plantagenet Cherokee"/>
+        <a:font script="Yiii" typeface="Microsoft Yi Baiti"/>
+        <a:font script="Tibt" typeface="Microsoft Himalaya"/>
+        <a:font script="Thaa" typeface="MV Boli"/>
+        <a:font script="Deva" typeface="Mangal"/>
+        <a:font script="Telu" typeface="Gautami"/>
+        <a:font script="Taml" typeface="Latha"/>
+        <a:font script="Syrc" typeface="Estrangelo Edessa"/>
+        <a:font script="Orya" typeface="Kalinga"/>
+        <a:font script="Mlym" typeface="Kartika"/>
+        <a:font script="Laoo" typeface="DokChampa"/>
+        <a:font script="Sinh" typeface="Iskoola Pota"/>
+        <a:font script="Mong" typeface="Mongolian Baiti"/>
+        <a:font script="Viet" typeface="Arial"/>
+        <a:font script="Uigh" typeface="Microsoft Uighur"/>
+        <a:font script="Geor" typeface="Sylfaen"/>
+      </a:minorFont>
+    </a:fontScheme>
+    <a:fmtScheme name="Office">
+      <a:fillStyleLst>
+        <a:solidFill>
+          <a:schemeClr val="phClr"/>
+        </a:solidFill>
+        <a:gradFill rotWithShape="1">
+          <a:gsLst>
+            <a:gs pos="0">
+              <a:schemeClr val="phClr">
+                <a:tint val="50000"/>
+                <a:satMod val="300000"/>
+              </a:schemeClr>
+            </a:gs>
+            <a:gs pos="35000">
+              <a:schemeClr val="phClr">
+                <a:tint val="37000"/>
+                <a:satMod val="300000"/>
+              </a:schemeClr>
+            </a:gs>
+            <a:gs pos="100000">
+              <a:schemeClr val="phClr">
+                <a:tint val="15000"/>
+                <a:satMod val="350000"/>
+              </a:schemeClr>
+            </a:gs>
+          </a:gsLst>
+          <a:lin ang="16200000" scaled="1"/>
+        </a:gradFill>
+        <a:gradFill rotWithShape="1">
+          <a:gsLst>
+            <a:gs pos="0">
+              <a:schemeClr val="phClr">
+                <a:shade val="51000"/>
+                <a:satMod val="130000"/>
+              </a:schemeClr>
+            </a:gs>
+            <a:gs pos="80000">
+              <a:schemeClr val="phClr">
+                <a:shade val="93000"/>
+                <a:satMod val="130000"/>
+              </a:schemeClr>
+            </a:gs>
+            <a:gs pos="100000">
+              <a:schemeClr val="phClr">
+                <a:shade val="94000"/>
+                <a:satMod val="135000"/>
+              </a:schemeClr>
+            </a:gs>
+          </a:gsLst>
+          <a:lin ang="16200000" scaled="0"/>
+        </a:gradFill>
+      </a:fillStyleLst>
+      <a:lnStyleLst>
+        <a:ln w="9525" cap="flat" cmpd="sng" algn="ctr">
+          <a:solidFill>
+            <a:schemeClr val="phClr">
+              <a:shade val="95000"/>
+              <a:satMod val="105000"/>
+            </a:schemeClr>
+          </a:solidFill>
+          <a:prstDash val="solid"/>
+        </a:ln>
+        <a:ln w="25400" cap="flat" cmpd="sng" algn="ctr">
+          <a:solidFill>
+            <a:schemeClr val="phClr"/>
+          </a:solidFill>
+          <a:prstDash val="solid"/>
+        </a:ln>
+        <a:ln w="38100" cap="flat" cmpd="sng" algn="ctr">
+          <a:solidFill>
+            <a:schemeClr val="phClr"/>
+          </a:solidFill>
+          <a:prstDash val="solid"/>
+        </a:ln>
+      </a:lnStyleLst>
+      <a:effectStyleLst>
+        <a:effectStyle>
+          <a:effectLst>
+            <a:outerShdw blurRad="40000" dist="20000" dir="5400000" rotWithShape="0">
+              <a:srgbClr val="000000">
+                <a:alpha val="38000"/>
+              </a:srgbClr>
+            </a:outerShdw>
+          </a:effectLst>
+        </a:effectStyle>
+        <a:effectStyle>
+          <a:effectLst>
+            <a:outerShdw blurRad="40000" dist="23000" dir="5400000" rotWithShape="0">
+              <a:srgbClr val="000000">
+                <a:alpha val="35000"/>
+              </a:srgbClr>
+            </a:outerShdw>
+          </a:effectLst>
+        </a:effectStyle>
+        <a:effectStyle>
+          <a:effectLst>
+            <a:outerShdw blurRad="40000" dist="23000" dir="5400000" rotWithShape="0">
+              <a:srgbClr val="000000">
+                <a:alpha val="35000"/>
+              </a:srgbClr>
+            </a:outerShdw>
+          </a:effectLst>
+          <a:scene3d>
+            <a:camera prst="orthographicFront">
+              <a:rot lat="0" lon="0" rev="0"/>
+            </a:camera>
+            <a:lightRig rig="threePt" dir="t">
+              <a:rot lat="0" lon="0" rev="1200000"/>
+            </a:lightRig>
+          </a:scene3d>
+          <a:sp3d>
+            <a:bevelT w="63500" h="25400"/>
+          </a:sp3d>
+        </a:effectStyle>
+      </a:effectStyleLst>
+      <a:bgFillStyleLst>
+        <a:solidFill>
+          <a:schemeClr val="phClr"/>
+        </a:solidFill>
+        <a:gradFill rotWithShape="1">
+          <a:gsLst>
+            <a:gs pos="0">
+              <a:schemeClr val="phClr">
+                <a:tint val="40000"/>
+                <a:satMod val="350000"/>
+              </a:schemeClr>
+            </a:gs>
+            <a:gs pos="40000">
+              <a:schemeClr val="phClr">
+                <a:tint val="45000"/>
+                <a:shade val="99000"/>
+                <a:satMod val="350000"/>
+              </a:schemeClr>
+            </a:gs>
+            <a:gs pos="100000">
+              <a:schemeClr val="phClr">
+                <a:shade val="20000"/>
+                <a:satMod val="255000"/>
+              </a:schemeClr>
+            </a:gs>
+          </a:gsLst>
+          <a:path path="circle">
+            <a:fillToRect l="50000" t="-80000" r="50000" b="180000"/>
+          </a:path>
+        </a:gradFill>
+        <a:gradFill rotWithShape="1">
+          <a:gsLst>
+            <a:gs pos="0">
+              <a:schemeClr val="phClr">
+                <a:tint val="80000"/>
+                <a:satMod val="300000"/>
+              </a:schemeClr>
+            </a:gs>
+            <a:gs pos="100000">
+              <a:schemeClr val="phClr">
+                <a:shade val="30000"/>
+                <a:satMod val="200000"/>
+              </a:schemeClr>
+            </a:gs>
+          </a:gsLst>
+          <a:path path="circle">
+            <a:fillToRect l="50000" t="50000" r="50000" b="50000"/>
+          </a:path>
+        </a:gradFill>
+      </a:bgFillStyleLst>
+    </a:fmtScheme>
+  </a:themeElements>
+  <a:objectDefaults/>
+  <a:extraClrSchemeLst/>
+</a:theme>
 </file>
</xml_diff>